<commit_message>
update to DIA Png
</commit_message>
<xml_diff>
--- a/prototypeStorage/prototype1Storage/Group3Presentation2/DBSlideshow.pptx
+++ b/prototypeStorage/prototype1Storage/Group3Presentation2/DBSlideshow.pptx
@@ -5434,7 +5434,7 @@
       </p:sp>
       <p:pic>
         <p:nvPicPr>
-          <p:cNvPr id="4" name="Content Placeholder 3"/>
+          <p:cNvPr id="8" name="Content Placeholder 7"/>
           <p:cNvPicPr>
             <a:picLocks noGrp="1" noChangeAspect="1"/>
           </p:cNvPicPr>
@@ -5456,8 +5456,8 @@
         </p:blipFill>
         <p:spPr>
           <a:xfrm>
-            <a:off x="1681105" y="685800"/>
-            <a:ext cx="6540616" cy="3614738"/>
+            <a:off x="1770374" y="246888"/>
+            <a:ext cx="8498338" cy="4598225"/>
           </a:xfrm>
         </p:spPr>
       </p:pic>

</xml_diff>